<commit_message>
Enhance numeric directive processing and update README for clarity
- Refactor numeric directive handling to ensure global processing occurs before regular placeholders.
- Update README to clarify return structure and rename `returnFullResponse` to `includeRawResponse`.
- Remove redundant numeric directive handling from placeholder substitution.
- Add comprehensive real-life test results to demonstrate functionality and performance.
- Fix module path in numeric debug test and update test data structure for consistency.
</commit_message>
<xml_diff>
--- a/test-files/outputs/test-output-numeric.pptx
+++ b/test-files/outputs/test-output-numeric.pptx
@@ -61,16 +61,16 @@
               <c:numCache>
                 <c:ptCount val="4"/>
                 <c:pt idx="0">
-                  <c:v>100000</c:v>
+                  <c:v>125000</c:v>
                 </c:pt>
                 <c:pt idx="1">
-                  <c:v>150000</c:v>
+                  <c:v>175000</c:v>
                 </c:pt>
                 <c:pt idx="2">
-                  <c:v>180000</c:v>
+                  <c:v>195000</c:v>
                 </c:pt>
                 <c:pt idx="3">
-                  <c:v>220000</c:v>
+                  <c:v>250000</c:v>
                 </c:pt>
               </c:numCache>
             </c:numRef>
@@ -160,7 +160,7 @@
           <a:p>
             <a:r>
               <a:rPr lang="en-US" sz="1400"/>
-              <a:t>   </a:t>
+              <a:t>(((100000=sales.q1))) (((150000=sales.q2))) (((180000=sales.q3))) (((220000=sales.q4)))</a:t>
             </a:r>
           </a:p>
         </p:txBody>

</xml_diff>